<commit_message>
Add total for 2020 to 2023 papers
</commit_message>
<xml_diff>
--- a/OpenAccessAnalysis/ReproduceResultsOpenAccessFigures.pptx
+++ b/OpenAccessAnalysis/ReproduceResultsOpenAccessFigures.pptx
@@ -104,6 +104,11 @@
       </a:defRPr>
     </a:lvl9pPr>
   </p:defaultTextStyle>
+  <p:extLst>
+    <p:ext uri="{EFAFB233-063F-42B5-8137-9DF3F51BA10A}">
+      <p15:sldGuideLst xmlns:p15="http://schemas.microsoft.com/office/powerpoint/2012/main"/>
+    </p:ext>
+  </p:extLst>
 </p:presentation>
 </file>
 
@@ -254,7 +259,7 @@
           <a:p>
             <a:fld id="{EA2B776D-4755-4361-BEA2-DB9E4A070BBE}" type="datetimeFigureOut">
               <a:rPr lang="en-US" smtClean="0"/>
-              <a:t>9/13/2023</a:t>
+              <a:t>9/14/2023</a:t>
             </a:fld>
             <a:endParaRPr lang="en-US"/>
           </a:p>
@@ -452,7 +457,7 @@
           <a:p>
             <a:fld id="{EA2B776D-4755-4361-BEA2-DB9E4A070BBE}" type="datetimeFigureOut">
               <a:rPr lang="en-US" smtClean="0"/>
-              <a:t>9/13/2023</a:t>
+              <a:t>9/14/2023</a:t>
             </a:fld>
             <a:endParaRPr lang="en-US"/>
           </a:p>
@@ -660,7 +665,7 @@
           <a:p>
             <a:fld id="{EA2B776D-4755-4361-BEA2-DB9E4A070BBE}" type="datetimeFigureOut">
               <a:rPr lang="en-US" smtClean="0"/>
-              <a:t>9/13/2023</a:t>
+              <a:t>9/14/2023</a:t>
             </a:fld>
             <a:endParaRPr lang="en-US"/>
           </a:p>
@@ -858,7 +863,7 @@
           <a:p>
             <a:fld id="{EA2B776D-4755-4361-BEA2-DB9E4A070BBE}" type="datetimeFigureOut">
               <a:rPr lang="en-US" smtClean="0"/>
-              <a:t>9/13/2023</a:t>
+              <a:t>9/14/2023</a:t>
             </a:fld>
             <a:endParaRPr lang="en-US"/>
           </a:p>
@@ -1133,7 +1138,7 @@
           <a:p>
             <a:fld id="{EA2B776D-4755-4361-BEA2-DB9E4A070BBE}" type="datetimeFigureOut">
               <a:rPr lang="en-US" smtClean="0"/>
-              <a:t>9/13/2023</a:t>
+              <a:t>9/14/2023</a:t>
             </a:fld>
             <a:endParaRPr lang="en-US"/>
           </a:p>
@@ -1398,7 +1403,7 @@
           <a:p>
             <a:fld id="{EA2B776D-4755-4361-BEA2-DB9E4A070BBE}" type="datetimeFigureOut">
               <a:rPr lang="en-US" smtClean="0"/>
-              <a:t>9/13/2023</a:t>
+              <a:t>9/14/2023</a:t>
             </a:fld>
             <a:endParaRPr lang="en-US"/>
           </a:p>
@@ -1810,7 +1815,7 @@
           <a:p>
             <a:fld id="{EA2B776D-4755-4361-BEA2-DB9E4A070BBE}" type="datetimeFigureOut">
               <a:rPr lang="en-US" smtClean="0"/>
-              <a:t>9/13/2023</a:t>
+              <a:t>9/14/2023</a:t>
             </a:fld>
             <a:endParaRPr lang="en-US"/>
           </a:p>
@@ -1951,7 +1956,7 @@
           <a:p>
             <a:fld id="{EA2B776D-4755-4361-BEA2-DB9E4A070BBE}" type="datetimeFigureOut">
               <a:rPr lang="en-US" smtClean="0"/>
-              <a:t>9/13/2023</a:t>
+              <a:t>9/14/2023</a:t>
             </a:fld>
             <a:endParaRPr lang="en-US"/>
           </a:p>
@@ -2064,7 +2069,7 @@
           <a:p>
             <a:fld id="{EA2B776D-4755-4361-BEA2-DB9E4A070BBE}" type="datetimeFigureOut">
               <a:rPr lang="en-US" smtClean="0"/>
-              <a:t>9/13/2023</a:t>
+              <a:t>9/14/2023</a:t>
             </a:fld>
             <a:endParaRPr lang="en-US"/>
           </a:p>
@@ -2375,7 +2380,7 @@
           <a:p>
             <a:fld id="{EA2B776D-4755-4361-BEA2-DB9E4A070BBE}" type="datetimeFigureOut">
               <a:rPr lang="en-US" smtClean="0"/>
-              <a:t>9/13/2023</a:t>
+              <a:t>9/14/2023</a:t>
             </a:fld>
             <a:endParaRPr lang="en-US"/>
           </a:p>
@@ -2663,7 +2668,7 @@
           <a:p>
             <a:fld id="{EA2B776D-4755-4361-BEA2-DB9E4A070BBE}" type="datetimeFigureOut">
               <a:rPr lang="en-US" smtClean="0"/>
-              <a:t>9/13/2023</a:t>
+              <a:t>9/14/2023</a:t>
             </a:fld>
             <a:endParaRPr lang="en-US"/>
           </a:p>
@@ -2904,7 +2909,7 @@
           <a:p>
             <a:fld id="{EA2B776D-4755-4361-BEA2-DB9E4A070BBE}" type="datetimeFigureOut">
               <a:rPr lang="en-US" smtClean="0"/>
-              <a:t>9/13/2023</a:t>
+              <a:t>9/14/2023</a:t>
             </a:fld>
             <a:endParaRPr lang="en-US"/>
           </a:p>
@@ -3607,7 +3612,7 @@
         </p:nvSpPr>
         <p:spPr>
           <a:xfrm>
-            <a:off x="1791092" y="1649938"/>
+            <a:off x="2032888" y="1561725"/>
             <a:ext cx="2903456" cy="1200329"/>
           </a:xfrm>
           <a:prstGeom prst="rect">
@@ -3819,8 +3824,8 @@
         </p:nvSpPr>
         <p:spPr>
           <a:xfrm>
-            <a:off x="1791092" y="3045823"/>
-            <a:ext cx="2592372" cy="1200329"/>
+            <a:off x="1725107" y="2904392"/>
+            <a:ext cx="2957708" cy="2031325"/>
           </a:xfrm>
           <a:prstGeom prst="rect">
             <a:avLst/>
@@ -3858,6 +3863,34 @@
                 <a:srgbClr val="7030A0"/>
               </a:solidFill>
             </a:endParaRPr>
+          </a:p>
+          <a:p>
+            <a:pPr marL="285750" indent="-285750">
+              <a:buFont typeface="Arial" panose="020B0604020202020204" pitchFamily="34" charset="0"/>
+              <a:buChar char="•"/>
+            </a:pPr>
+            <a:r>
+              <a:rPr lang="en-US" dirty="0">
+                <a:solidFill>
+                  <a:srgbClr val="7030A0"/>
+                </a:solidFill>
+              </a:rPr>
+              <a:t>Frontiers in Engineering and the Built Environment</a:t>
+            </a:r>
+          </a:p>
+          <a:p>
+            <a:pPr marL="285750" indent="-285750">
+              <a:buFont typeface="Arial" panose="020B0604020202020204" pitchFamily="34" charset="0"/>
+              <a:buChar char="•"/>
+            </a:pPr>
+            <a:r>
+              <a:rPr lang="en-US" dirty="0">
+                <a:solidFill>
+                  <a:srgbClr val="7030A0"/>
+                </a:solidFill>
+              </a:rPr>
+              <a:t>76 other Emerald Journals</a:t>
+            </a:r>
           </a:p>
           <a:p>
             <a:pPr marL="285750" indent="-285750">

</xml_diff>